<commit_message>
Figures for DL project
</commit_message>
<xml_diff>
--- a/DL_course_1.pptx
+++ b/DL_course_1.pptx
@@ -493,7 +493,7 @@
           <a:p>
             <a:fld id="{5BA66907-C9CB-4193-9834-58A345F7872F}" type="datetimeFigureOut">
               <a:rPr lang="en-US" smtClean="0"/>
-              <a:t>3/20/2020</a:t>
+              <a:t>3/16/2021</a:t>
             </a:fld>
             <a:endParaRPr lang="en-US"/>
           </a:p>
@@ -7483,8 +7483,8 @@
           </a:p>
         </p:txBody>
       </p:sp>
-      <mc:AlternateContent xmlns:mc="http://schemas.openxmlformats.org/markup-compatibility/2006" xmlns:a14="http://schemas.microsoft.com/office/drawing/2010/main">
-        <mc:Choice Requires="a14">
+      <mc:AlternateContent xmlns:mc="http://schemas.openxmlformats.org/markup-compatibility/2006">
+        <mc:Choice xmlns:a14="http://schemas.microsoft.com/office/drawing/2010/main" Requires="a14">
           <p:sp>
             <p:nvSpPr>
               <p:cNvPr id="8" name="TextBox 7">
@@ -7546,7 +7546,7 @@
                               </a:solidFill>
                               <a:latin typeface="Cambria Math" panose="02040503050406030204" pitchFamily="18" charset="0"/>
                             </a:rPr>
-                            <m:t>𝜃</m:t>
+                            <m:t>𝑤</m:t>
                           </m:r>
                         </m:e>
                         <m:sub>
@@ -7573,7 +7573,7 @@
             </p:txBody>
           </p:sp>
         </mc:Choice>
-        <mc:Fallback xmlns="">
+        <mc:Fallback>
           <p:sp>
             <p:nvSpPr>
               <p:cNvPr id="8" name="TextBox 7">
@@ -7618,8 +7618,8 @@
           </p:sp>
         </mc:Fallback>
       </mc:AlternateContent>
-      <mc:AlternateContent xmlns:mc="http://schemas.openxmlformats.org/markup-compatibility/2006" xmlns:a14="http://schemas.microsoft.com/office/drawing/2010/main">
-        <mc:Choice Requires="a14">
+      <mc:AlternateContent xmlns:mc="http://schemas.openxmlformats.org/markup-compatibility/2006">
+        <mc:Choice xmlns:a14="http://schemas.microsoft.com/office/drawing/2010/main" Requires="a14">
           <p:sp>
             <p:nvSpPr>
               <p:cNvPr id="27" name="TextBox 26">
@@ -7681,7 +7681,7 @@
                               </a:solidFill>
                               <a:latin typeface="Cambria Math" panose="02040503050406030204" pitchFamily="18" charset="0"/>
                             </a:rPr>
-                            <m:t>𝜃</m:t>
+                            <m:t>𝑤</m:t>
                           </m:r>
                         </m:e>
                         <m:sub>
@@ -7708,7 +7708,7 @@
             </p:txBody>
           </p:sp>
         </mc:Choice>
-        <mc:Fallback xmlns="">
+        <mc:Fallback>
           <p:sp>
             <p:nvSpPr>
               <p:cNvPr id="27" name="TextBox 26">
@@ -7823,8 +7823,8 @@
           </a:p>
         </p:txBody>
       </p:sp>
-      <mc:AlternateContent xmlns:mc="http://schemas.openxmlformats.org/markup-compatibility/2006" xmlns:a14="http://schemas.microsoft.com/office/drawing/2010/main">
-        <mc:Choice Requires="a14">
+      <mc:AlternateContent xmlns:mc="http://schemas.openxmlformats.org/markup-compatibility/2006">
+        <mc:Choice xmlns:a14="http://schemas.microsoft.com/office/drawing/2010/main" Requires="a14">
           <p:sp>
             <p:nvSpPr>
               <p:cNvPr id="10" name="TextBox 9">
@@ -7880,7 +7880,7 @@
                             </a:solidFill>
                             <a:latin typeface="Cambria Math" panose="02040503050406030204" pitchFamily="18" charset="0"/>
                           </a:rPr>
-                          <m:t>𝜃</m:t>
+                          <m:t>𝑤</m:t>
                         </m:r>
                       </m:e>
                       <m:sub>
@@ -7932,7 +7932,7 @@
                             </a:solidFill>
                             <a:latin typeface="Cambria Math" panose="02040503050406030204" pitchFamily="18" charset="0"/>
                           </a:rPr>
-                          <m:t>𝜃</m:t>
+                          <m:t>𝑤</m:t>
                         </m:r>
                       </m:e>
                       <m:sub>
@@ -8014,7 +8014,7 @@
                             </a:solidFill>
                             <a:latin typeface="Cambria Math" panose="02040503050406030204" pitchFamily="18" charset="0"/>
                           </a:rPr>
-                          <m:t>𝜃</m:t>
+                          <m:t>𝑤</m:t>
                         </m:r>
                       </m:e>
                       <m:sub>
@@ -8103,7 +8103,7 @@
             </p:txBody>
           </p:sp>
         </mc:Choice>
-        <mc:Fallback xmlns="">
+        <mc:Fallback>
           <p:sp>
             <p:nvSpPr>
               <p:cNvPr id="10" name="TextBox 9">
@@ -12227,6 +12227,53 @@
           </p:sp>
         </mc:Fallback>
       </mc:AlternateContent>
+      <p:pic>
+        <p:nvPicPr>
+          <p:cNvPr id="4" name="Picture 2" descr="ReLU — Most popular Activation Function for Deep Neural Networks | by  Sonish Sivarajkumar | Medium">
+            <a:extLst>
+              <a:ext uri="{FF2B5EF4-FFF2-40B4-BE49-F238E27FC236}">
+                <a16:creationId xmlns:a16="http://schemas.microsoft.com/office/drawing/2014/main" id="{BB53EA53-F4CF-4176-A9D8-39F3FA02BE4B}"/>
+              </a:ext>
+            </a:extLst>
+          </p:cNvPr>
+          <p:cNvPicPr>
+            <a:picLocks noChangeAspect="1" noChangeArrowheads="1"/>
+          </p:cNvPicPr>
+          <p:nvPr/>
+        </p:nvPicPr>
+        <p:blipFill>
+          <a:blip r:embed="rId4">
+            <a:extLst>
+              <a:ext uri="{28A0092B-C50C-407E-A947-70E740481C1C}">
+                <a14:useLocalDpi xmlns:a14="http://schemas.microsoft.com/office/drawing/2010/main" val="0"/>
+              </a:ext>
+            </a:extLst>
+          </a:blip>
+          <a:srcRect/>
+          <a:stretch>
+            <a:fillRect/>
+          </a:stretch>
+        </p:blipFill>
+        <p:spPr bwMode="auto">
+          <a:xfrm>
+            <a:off x="5216664" y="1525349"/>
+            <a:ext cx="2036895" cy="927125"/>
+          </a:xfrm>
+          <a:prstGeom prst="rect">
+            <a:avLst/>
+          </a:prstGeom>
+          <a:noFill/>
+          <a:extLst>
+            <a:ext uri="{909E8E84-426E-40DD-AFC4-6F175D3DCCD1}">
+              <a14:hiddenFill xmlns:a14="http://schemas.microsoft.com/office/drawing/2010/main">
+                <a:solidFill>
+                  <a:srgbClr val="FFFFFF"/>
+                </a:solidFill>
+              </a14:hiddenFill>
+            </a:ext>
+          </a:extLst>
+        </p:spPr>
+      </p:pic>
     </p:spTree>
     <p:extLst>
       <p:ext uri="{BB962C8B-B14F-4D97-AF65-F5344CB8AC3E}">

</xml_diff>